<commit_message>
Evaluate Fitness fixed, Minor fix to datapath of POP_RF
</commit_message>
<xml_diff>
--- a/EC_FINAL_PROJECT/EC_FINAL_PROJECT/verilog/POP_RF/CrossOver_Mutate_Truncation.pptx
+++ b/EC_FINAL_PROJECT/EC_FINAL_PROJECT/verilog/POP_RF/CrossOver_Mutate_Truncation.pptx
@@ -3298,25 +3298,13 @@
             <a:p>
               <a:r>
                 <a:rPr lang="en-US" altLang="zh-TW" sz="800" dirty="0"/>
-                <a:t>Interact</a:t>
+                <a:t>DF_CRX</a:t>
               </a:r>
             </a:p>
             <a:p>
               <a:r>
                 <a:rPr lang="en-US" altLang="zh-TW" sz="800" dirty="0"/>
-                <a:t>Energy</a:t>
-              </a:r>
-            </a:p>
-            <a:p>
-              <a:r>
-                <a:rPr lang="en-US" altLang="zh-TW" sz="800" dirty="0"/>
-                <a:t>Pipe</a:t>
-              </a:r>
-            </a:p>
-            <a:p>
-              <a:r>
-                <a:rPr lang="en-US" altLang="zh-TW" sz="800" dirty="0"/>
-                <a:t>DF_ADD1</a:t>
+                <a:t>PIPE</a:t>
               </a:r>
             </a:p>
             <a:p>
@@ -3724,148 +3712,6 @@
           </a:p>
         </p:txBody>
       </p:sp>
-      <p:grpSp>
-        <p:nvGrpSpPr>
-          <p:cNvPr id="2" name="群組 1">
-            <a:extLst>
-              <a:ext uri="{FF2B5EF4-FFF2-40B4-BE49-F238E27FC236}">
-                <a16:creationId xmlns:a16="http://schemas.microsoft.com/office/drawing/2014/main" id="{A2302DF5-A8AB-4028-8E47-AF165F8F22D0}"/>
-              </a:ext>
-            </a:extLst>
-          </p:cNvPr>
-          <p:cNvGrpSpPr/>
-          <p:nvPr/>
-        </p:nvGrpSpPr>
-        <p:grpSpPr>
-          <a:xfrm>
-            <a:off x="1680949" y="2160272"/>
-            <a:ext cx="558465" cy="390631"/>
-            <a:chOff x="4626544" y="367171"/>
-            <a:chExt cx="558465" cy="390631"/>
-          </a:xfrm>
-        </p:grpSpPr>
-        <p:cxnSp>
-          <p:nvCxnSpPr>
-            <p:cNvPr id="125" name="直線單箭頭接點 124">
-              <a:extLst>
-                <a:ext uri="{FF2B5EF4-FFF2-40B4-BE49-F238E27FC236}">
-                  <a16:creationId xmlns:a16="http://schemas.microsoft.com/office/drawing/2014/main" id="{402BE50D-E4C2-49BE-8045-22470DA0C0C3}"/>
-                </a:ext>
-              </a:extLst>
-            </p:cNvPr>
-            <p:cNvCxnSpPr>
-              <a:cxnSpLocks/>
-            </p:cNvCxnSpPr>
-            <p:nvPr/>
-          </p:nvCxnSpPr>
-          <p:spPr>
-            <a:xfrm>
-              <a:off x="4626544" y="675073"/>
-              <a:ext cx="478006" cy="0"/>
-            </a:xfrm>
-            <a:prstGeom prst="straightConnector1">
-              <a:avLst/>
-            </a:prstGeom>
-            <a:ln>
-              <a:tailEnd type="triangle"/>
-            </a:ln>
-          </p:spPr>
-          <p:style>
-            <a:lnRef idx="3">
-              <a:schemeClr val="accent1"/>
-            </a:lnRef>
-            <a:fillRef idx="0">
-              <a:schemeClr val="accent1"/>
-            </a:fillRef>
-            <a:effectRef idx="2">
-              <a:schemeClr val="accent1"/>
-            </a:effectRef>
-            <a:fontRef idx="minor">
-              <a:schemeClr val="tx1"/>
-            </a:fontRef>
-          </p:style>
-        </p:cxnSp>
-        <p:cxnSp>
-          <p:nvCxnSpPr>
-            <p:cNvPr id="308" name="直線接點 307">
-              <a:extLst>
-                <a:ext uri="{FF2B5EF4-FFF2-40B4-BE49-F238E27FC236}">
-                  <a16:creationId xmlns:a16="http://schemas.microsoft.com/office/drawing/2014/main" id="{D0CB0D8D-8888-4240-A539-E845342C44BA}"/>
-                </a:ext>
-              </a:extLst>
-            </p:cNvPr>
-            <p:cNvCxnSpPr>
-              <a:cxnSpLocks/>
-            </p:cNvCxnSpPr>
-            <p:nvPr/>
-          </p:nvCxnSpPr>
-          <p:spPr>
-            <a:xfrm>
-              <a:off x="4750671" y="613267"/>
-              <a:ext cx="97186" cy="144535"/>
-            </a:xfrm>
-            <a:prstGeom prst="line">
-              <a:avLst/>
-            </a:prstGeom>
-          </p:spPr>
-          <p:style>
-            <a:lnRef idx="3">
-              <a:schemeClr val="dk1"/>
-            </a:lnRef>
-            <a:fillRef idx="0">
-              <a:schemeClr val="dk1"/>
-            </a:fillRef>
-            <a:effectRef idx="2">
-              <a:schemeClr val="dk1"/>
-            </a:effectRef>
-            <a:fontRef idx="minor">
-              <a:schemeClr val="tx1"/>
-            </a:fontRef>
-          </p:style>
-        </p:cxnSp>
-        <p:sp>
-          <p:nvSpPr>
-            <p:cNvPr id="311" name="文字方塊 310">
-              <a:extLst>
-                <a:ext uri="{FF2B5EF4-FFF2-40B4-BE49-F238E27FC236}">
-                  <a16:creationId xmlns:a16="http://schemas.microsoft.com/office/drawing/2014/main" id="{B8EB8B29-DF03-4777-93B3-EB5B5AB8CBE4}"/>
-                </a:ext>
-              </a:extLst>
-            </p:cNvPr>
-            <p:cNvSpPr txBox="1"/>
-            <p:nvPr/>
-          </p:nvSpPr>
-          <p:spPr>
-            <a:xfrm>
-              <a:off x="4651609" y="367171"/>
-              <a:ext cx="533400" cy="276999"/>
-            </a:xfrm>
-            <a:prstGeom prst="rect">
-              <a:avLst/>
-            </a:prstGeom>
-            <a:noFill/>
-          </p:spPr>
-          <p:txBody>
-            <a:bodyPr wrap="square" rtlCol="0">
-              <a:spAutoFit/>
-            </a:bodyPr>
-            <a:lstStyle/>
-            <a:p>
-              <a:r>
-                <a:rPr lang="en-US" altLang="zh-TW" sz="1200" dirty="0">
-                  <a:latin typeface="Times New Roman" panose="02020603050405020304" pitchFamily="18" charset="0"/>
-                  <a:cs typeface="Times New Roman" panose="02020603050405020304" pitchFamily="18" charset="0"/>
-                </a:rPr>
-                <a:t>5</a:t>
-              </a:r>
-              <a:endParaRPr lang="zh-TW" altLang="en-US" sz="1200" dirty="0">
-                <a:latin typeface="Times New Roman" panose="02020603050405020304" pitchFamily="18" charset="0"/>
-                <a:cs typeface="Times New Roman" panose="02020603050405020304" pitchFamily="18" charset="0"/>
-              </a:endParaRPr>
-            </a:p>
-          </p:txBody>
-        </p:sp>
-      </p:grpSp>
       <p:grpSp>
         <p:nvGrpSpPr>
           <p:cNvPr id="25" name="群組 24">

</xml_diff>

<commit_message>
Fix to DP of Pop_rf
</commit_message>
<xml_diff>
--- a/EC_FINAL_PROJECT/EC_FINAL_PROJECT/verilog/POP_RF/CrossOver_Mutate_Truncation.pptx
+++ b/EC_FINAL_PROJECT/EC_FINAL_PROJECT/verilog/POP_RF/CrossOver_Mutate_Truncation.pptx
@@ -8082,7 +8082,7 @@
         <p:spPr>
           <a:xfrm>
             <a:off x="2175499" y="5536541"/>
-            <a:ext cx="564135" cy="192143"/>
+            <a:ext cx="1012903" cy="276999"/>
           </a:xfrm>
           <a:prstGeom prst="rect">
             <a:avLst/>
@@ -8100,7 +8100,7 @@
                 <a:latin typeface="Times New Roman" panose="02020603050405020304" pitchFamily="18" charset="0"/>
                 <a:cs typeface="Times New Roman" panose="02020603050405020304" pitchFamily="18" charset="0"/>
               </a:rPr>
-              <a:t>11*2</a:t>
+              <a:t>11*2+8+10</a:t>
             </a:r>
             <a:endParaRPr lang="zh-TW" altLang="en-US" sz="1200" dirty="0">
               <a:latin typeface="Times New Roman" panose="02020603050405020304" pitchFamily="18" charset="0"/>
@@ -8142,7 +8142,7 @@
                 <a:latin typeface="Times New Roman" panose="02020603050405020304" pitchFamily="18" charset="0"/>
                 <a:cs typeface="Times New Roman" panose="02020603050405020304" pitchFamily="18" charset="0"/>
               </a:rPr>
-              <a:t>Offspring_wb_state</a:t>
+              <a:t>Offspring_Ind_wb</a:t>
             </a:r>
             <a:endParaRPr lang="zh-TW" altLang="en-US" sz="800" dirty="0">
               <a:latin typeface="Times New Roman" panose="02020603050405020304" pitchFamily="18" charset="0"/>
@@ -9390,10 +9390,10 @@
         </p:nvGrpSpPr>
         <p:grpSpPr>
           <a:xfrm>
-            <a:off x="654002" y="5529782"/>
-            <a:ext cx="564135" cy="383069"/>
+            <a:off x="525566" y="5528907"/>
+            <a:ext cx="960851" cy="646331"/>
             <a:chOff x="2327899" y="5688941"/>
-            <a:chExt cx="564135" cy="383069"/>
+            <a:chExt cx="564135" cy="646331"/>
           </a:xfrm>
         </p:grpSpPr>
         <p:cxnSp>
@@ -9449,7 +9449,7 @@
           <p:spPr>
             <a:xfrm>
               <a:off x="2327899" y="5688941"/>
-              <a:ext cx="564135" cy="192143"/>
+              <a:ext cx="564135" cy="646331"/>
             </a:xfrm>
             <a:prstGeom prst="rect">
               <a:avLst/>
@@ -9467,7 +9467,7 @@
                   <a:latin typeface="Times New Roman" panose="02020603050405020304" pitchFamily="18" charset="0"/>
                   <a:cs typeface="Times New Roman" panose="02020603050405020304" pitchFamily="18" charset="0"/>
                 </a:rPr>
-                <a:t>11*2</a:t>
+                <a:t>11*2+8+10</a:t>
               </a:r>
               <a:endParaRPr lang="zh-TW" altLang="en-US" sz="1200" dirty="0">
                 <a:latin typeface="Times New Roman" panose="02020603050405020304" pitchFamily="18" charset="0"/>
@@ -9491,7 +9491,7 @@
         </p:nvSpPr>
         <p:spPr>
           <a:xfrm>
-            <a:off x="-15949" y="5591018"/>
+            <a:off x="-17210" y="5576457"/>
             <a:ext cx="1162511" cy="215444"/>
           </a:xfrm>
           <a:prstGeom prst="rect">
@@ -9510,7 +9510,7 @@
                 <a:latin typeface="Times New Roman" panose="02020603050405020304" pitchFamily="18" charset="0"/>
                 <a:cs typeface="Times New Roman" panose="02020603050405020304" pitchFamily="18" charset="0"/>
               </a:rPr>
-              <a:t>TourState_MU</a:t>
+              <a:t>TourInd_MU</a:t>
             </a:r>
             <a:endParaRPr lang="zh-TW" altLang="en-US" sz="800" dirty="0">
               <a:latin typeface="Times New Roman" panose="02020603050405020304" pitchFamily="18" charset="0"/>
@@ -11161,10 +11161,10 @@
         </p:nvGrpSpPr>
         <p:grpSpPr>
           <a:xfrm>
-            <a:off x="6740039" y="3404809"/>
-            <a:ext cx="1380190" cy="565988"/>
-            <a:chOff x="6740039" y="3404809"/>
-            <a:chExt cx="1380190" cy="565988"/>
+            <a:off x="5993432" y="3334411"/>
+            <a:ext cx="1380190" cy="529674"/>
+            <a:chOff x="5993432" y="3334411"/>
+            <a:chExt cx="1380190" cy="529674"/>
           </a:xfrm>
         </p:grpSpPr>
         <p:cxnSp>
@@ -11183,7 +11183,7 @@
           </p:nvCxnSpPr>
           <p:spPr>
             <a:xfrm>
-              <a:off x="7383645" y="3649524"/>
+              <a:off x="7257571" y="3542812"/>
               <a:ext cx="0" cy="321273"/>
             </a:xfrm>
             <a:prstGeom prst="straightConnector1">
@@ -11222,7 +11222,7 @@
           </p:nvSpPr>
           <p:spPr>
             <a:xfrm>
-              <a:off x="6740039" y="3404809"/>
+              <a:off x="5993432" y="3334411"/>
               <a:ext cx="1380190" cy="276999"/>
             </a:xfrm>
             <a:prstGeom prst="rect">
@@ -11454,190 +11454,6 @@
                 <a:t>newStateCRX</a:t>
               </a:r>
               <a:endParaRPr lang="zh-TW" altLang="en-US" sz="800" dirty="0">
-                <a:latin typeface="Times New Roman" panose="02020603050405020304" pitchFamily="18" charset="0"/>
-                <a:cs typeface="Times New Roman" panose="02020603050405020304" pitchFamily="18" charset="0"/>
-              </a:endParaRPr>
-            </a:p>
-          </p:txBody>
-        </p:sp>
-      </p:grpSp>
-      <p:grpSp>
-        <p:nvGrpSpPr>
-          <p:cNvPr id="281" name="群組 280">
-            <a:extLst>
-              <a:ext uri="{FF2B5EF4-FFF2-40B4-BE49-F238E27FC236}">
-                <a16:creationId xmlns:a16="http://schemas.microsoft.com/office/drawing/2014/main" id="{493CE736-2FFD-4203-A3A1-E5B133453B85}"/>
-              </a:ext>
-            </a:extLst>
-          </p:cNvPr>
-          <p:cNvGrpSpPr/>
-          <p:nvPr/>
-        </p:nvGrpSpPr>
-        <p:grpSpPr>
-          <a:xfrm>
-            <a:off x="5775977" y="1183285"/>
-            <a:ext cx="3673358" cy="491990"/>
-            <a:chOff x="271714" y="6407804"/>
-            <a:chExt cx="1503787" cy="491990"/>
-          </a:xfrm>
-        </p:grpSpPr>
-        <p:cxnSp>
-          <p:nvCxnSpPr>
-            <p:cNvPr id="282" name="直線單箭頭接點 281">
-              <a:extLst>
-                <a:ext uri="{FF2B5EF4-FFF2-40B4-BE49-F238E27FC236}">
-                  <a16:creationId xmlns:a16="http://schemas.microsoft.com/office/drawing/2014/main" id="{08BC83A9-A3E5-4701-8166-A2BD140F7894}"/>
-                </a:ext>
-              </a:extLst>
-            </p:cNvPr>
-            <p:cNvCxnSpPr>
-              <a:cxnSpLocks/>
-            </p:cNvCxnSpPr>
-            <p:nvPr/>
-          </p:nvCxnSpPr>
-          <p:spPr>
-            <a:xfrm>
-              <a:off x="271714" y="6664305"/>
-              <a:ext cx="1226857" cy="0"/>
-            </a:xfrm>
-            <a:prstGeom prst="straightConnector1">
-              <a:avLst/>
-            </a:prstGeom>
-            <a:ln>
-              <a:tailEnd type="triangle"/>
-            </a:ln>
-          </p:spPr>
-          <p:style>
-            <a:lnRef idx="3">
-              <a:schemeClr val="accent1"/>
-            </a:lnRef>
-            <a:fillRef idx="0">
-              <a:schemeClr val="accent1"/>
-            </a:fillRef>
-            <a:effectRef idx="2">
-              <a:schemeClr val="accent1"/>
-            </a:effectRef>
-            <a:fontRef idx="minor">
-              <a:schemeClr val="tx1"/>
-            </a:fontRef>
-          </p:style>
-        </p:cxnSp>
-        <p:sp>
-          <p:nvSpPr>
-            <p:cNvPr id="284" name="文字方塊 283">
-              <a:extLst>
-                <a:ext uri="{FF2B5EF4-FFF2-40B4-BE49-F238E27FC236}">
-                  <a16:creationId xmlns:a16="http://schemas.microsoft.com/office/drawing/2014/main" id="{B2F54F44-CA19-4B05-82B3-74C2E3D2D60C}"/>
-                </a:ext>
-              </a:extLst>
-            </p:cNvPr>
-            <p:cNvSpPr txBox="1"/>
-            <p:nvPr/>
-          </p:nvSpPr>
-          <p:spPr>
-            <a:xfrm>
-              <a:off x="612990" y="6684350"/>
-              <a:ext cx="1162511" cy="215444"/>
-            </a:xfrm>
-            <a:prstGeom prst="rect">
-              <a:avLst/>
-            </a:prstGeom>
-            <a:noFill/>
-          </p:spPr>
-          <p:txBody>
-            <a:bodyPr wrap="square" rtlCol="0">
-              <a:spAutoFit/>
-            </a:bodyPr>
-            <a:lstStyle/>
-            <a:p>
-              <a:r>
-                <a:rPr lang="en-US" altLang="zh-TW" sz="800" dirty="0" err="1">
-                  <a:latin typeface="Times New Roman" panose="02020603050405020304" pitchFamily="18" charset="0"/>
-                  <a:cs typeface="Times New Roman" panose="02020603050405020304" pitchFamily="18" charset="0"/>
-                </a:rPr>
-                <a:t>offSpringMutateRate_CRX</a:t>
-              </a:r>
-              <a:endParaRPr lang="zh-TW" altLang="en-US" sz="800" dirty="0">
-                <a:latin typeface="Times New Roman" panose="02020603050405020304" pitchFamily="18" charset="0"/>
-                <a:cs typeface="Times New Roman" panose="02020603050405020304" pitchFamily="18" charset="0"/>
-              </a:endParaRPr>
-            </a:p>
-          </p:txBody>
-        </p:sp>
-        <p:cxnSp>
-          <p:nvCxnSpPr>
-            <p:cNvPr id="286" name="直線接點 285">
-              <a:extLst>
-                <a:ext uri="{FF2B5EF4-FFF2-40B4-BE49-F238E27FC236}">
-                  <a16:creationId xmlns:a16="http://schemas.microsoft.com/office/drawing/2014/main" id="{97248665-7DF4-4BD7-86EF-5D4F1D1E1D4A}"/>
-                </a:ext>
-              </a:extLst>
-            </p:cNvPr>
-            <p:cNvCxnSpPr>
-              <a:cxnSpLocks/>
-            </p:cNvCxnSpPr>
-            <p:nvPr/>
-          </p:nvCxnSpPr>
-          <p:spPr>
-            <a:xfrm>
-              <a:off x="739660" y="6604353"/>
-              <a:ext cx="173322" cy="148216"/>
-            </a:xfrm>
-            <a:prstGeom prst="line">
-              <a:avLst/>
-            </a:prstGeom>
-          </p:spPr>
-          <p:style>
-            <a:lnRef idx="3">
-              <a:schemeClr val="dk1"/>
-            </a:lnRef>
-            <a:fillRef idx="0">
-              <a:schemeClr val="dk1"/>
-            </a:fillRef>
-            <a:effectRef idx="2">
-              <a:schemeClr val="dk1"/>
-            </a:effectRef>
-            <a:fontRef idx="minor">
-              <a:schemeClr val="tx1"/>
-            </a:fontRef>
-          </p:style>
-        </p:cxnSp>
-        <p:sp>
-          <p:nvSpPr>
-            <p:cNvPr id="289" name="文字方塊 288">
-              <a:extLst>
-                <a:ext uri="{FF2B5EF4-FFF2-40B4-BE49-F238E27FC236}">
-                  <a16:creationId xmlns:a16="http://schemas.microsoft.com/office/drawing/2014/main" id="{C62D878A-7328-417D-8B91-E5BC1D5F72F3}"/>
-                </a:ext>
-              </a:extLst>
-            </p:cNvPr>
-            <p:cNvSpPr txBox="1"/>
-            <p:nvPr/>
-          </p:nvSpPr>
-          <p:spPr>
-            <a:xfrm>
-              <a:off x="767546" y="6407804"/>
-              <a:ext cx="564135" cy="276999"/>
-            </a:xfrm>
-            <a:prstGeom prst="rect">
-              <a:avLst/>
-            </a:prstGeom>
-            <a:noFill/>
-          </p:spPr>
-          <p:txBody>
-            <a:bodyPr wrap="square" rtlCol="0">
-              <a:spAutoFit/>
-            </a:bodyPr>
-            <a:lstStyle/>
-            <a:p>
-              <a:r>
-                <a:rPr lang="en-US" altLang="zh-TW" sz="1200" dirty="0">
-                  <a:latin typeface="Times New Roman" panose="02020603050405020304" pitchFamily="18" charset="0"/>
-                  <a:cs typeface="Times New Roman" panose="02020603050405020304" pitchFamily="18" charset="0"/>
-                </a:rPr>
-                <a:t>8</a:t>
-              </a:r>
-              <a:endParaRPr lang="zh-TW" altLang="en-US" sz="1200" dirty="0">
                 <a:latin typeface="Times New Roman" panose="02020603050405020304" pitchFamily="18" charset="0"/>
                 <a:cs typeface="Times New Roman" panose="02020603050405020304" pitchFamily="18" charset="0"/>
               </a:endParaRPr>
@@ -12261,10 +12077,10 @@
         </p:nvGrpSpPr>
         <p:grpSpPr>
           <a:xfrm>
-            <a:off x="5810606" y="6384995"/>
-            <a:ext cx="4301400" cy="493580"/>
-            <a:chOff x="271714" y="6407804"/>
-            <a:chExt cx="1766430" cy="493580"/>
+            <a:off x="5728791" y="6296846"/>
+            <a:ext cx="3585601" cy="344765"/>
+            <a:chOff x="242635" y="6407804"/>
+            <a:chExt cx="1472477" cy="344765"/>
           </a:xfrm>
         </p:grpSpPr>
         <p:cxnSp>
@@ -12322,7 +12138,7 @@
           </p:nvSpPr>
           <p:spPr>
             <a:xfrm>
-              <a:off x="565667" y="6685940"/>
+              <a:off x="242635" y="6469359"/>
               <a:ext cx="1472477" cy="215444"/>
             </a:xfrm>
             <a:prstGeom prst="rect">
@@ -13256,9 +13072,9 @@
           <p:nvPr/>
         </p:nvCxnSpPr>
         <p:spPr>
-          <a:xfrm rot="5400000">
-            <a:off x="7242049" y="2438794"/>
-            <a:ext cx="263218" cy="0"/>
+          <a:xfrm>
+            <a:off x="7575550" y="2299439"/>
+            <a:ext cx="0" cy="1778602"/>
           </a:xfrm>
           <a:prstGeom prst="straightConnector1">
             <a:avLst/>
@@ -13663,7 +13479,7 @@
         </p:nvSpPr>
         <p:spPr>
           <a:xfrm>
-            <a:off x="7321732" y="2278619"/>
+            <a:off x="7509461" y="2240525"/>
             <a:ext cx="1666700" cy="215444"/>
           </a:xfrm>
           <a:prstGeom prst="rect">
@@ -14166,203 +13982,182 @@
           </p:txBody>
         </p:sp>
       </p:grpSp>
-      <p:grpSp>
-        <p:nvGrpSpPr>
-          <p:cNvPr id="507" name="群組 506">
+      <p:cxnSp>
+        <p:nvCxnSpPr>
+          <p:cNvPr id="508" name="直線單箭頭接點 507">
             <a:extLst>
               <a:ext uri="{FF2B5EF4-FFF2-40B4-BE49-F238E27FC236}">
-                <a16:creationId xmlns:a16="http://schemas.microsoft.com/office/drawing/2014/main" id="{74180564-C48E-40B1-96F2-52616968C72E}"/>
+                <a16:creationId xmlns:a16="http://schemas.microsoft.com/office/drawing/2014/main" id="{7CFEE001-5076-4DF0-8935-2490C38AF687}"/>
               </a:ext>
             </a:extLst>
           </p:cNvPr>
-          <p:cNvGrpSpPr/>
+          <p:cNvCxnSpPr>
+            <a:cxnSpLocks/>
+          </p:cNvCxnSpPr>
           <p:nvPr/>
-        </p:nvGrpSpPr>
-        <p:grpSpPr>
-          <a:xfrm rot="16200000">
-            <a:off x="9950873" y="5507218"/>
-            <a:ext cx="1008882" cy="1259670"/>
-            <a:chOff x="271714" y="6472833"/>
-            <a:chExt cx="1299886" cy="1259670"/>
+        </p:nvCxnSpPr>
+        <p:spPr>
+          <a:xfrm flipH="1" flipV="1">
+            <a:off x="10007309" y="5632613"/>
+            <a:ext cx="14602" cy="797998"/>
           </a:xfrm>
-        </p:grpSpPr>
-        <p:cxnSp>
-          <p:nvCxnSpPr>
-            <p:cNvPr id="508" name="直線單箭頭接點 507">
-              <a:extLst>
-                <a:ext uri="{FF2B5EF4-FFF2-40B4-BE49-F238E27FC236}">
-                  <a16:creationId xmlns:a16="http://schemas.microsoft.com/office/drawing/2014/main" id="{7CFEE001-5076-4DF0-8935-2490C38AF687}"/>
-                </a:ext>
-              </a:extLst>
-            </p:cNvPr>
-            <p:cNvCxnSpPr>
-              <a:cxnSpLocks/>
-            </p:cNvCxnSpPr>
-            <p:nvPr/>
-          </p:nvCxnSpPr>
-          <p:spPr>
-            <a:xfrm rot="5400000" flipH="1" flipV="1">
-              <a:off x="916834" y="6009540"/>
-              <a:ext cx="9645" cy="1299886"/>
-            </a:xfrm>
-            <a:prstGeom prst="straightConnector1">
-              <a:avLst/>
-            </a:prstGeom>
-            <a:ln>
-              <a:tailEnd type="triangle"/>
-            </a:ln>
-          </p:spPr>
-          <p:style>
-            <a:lnRef idx="3">
-              <a:schemeClr val="accent1"/>
-            </a:lnRef>
-            <a:fillRef idx="0">
-              <a:schemeClr val="accent1"/>
-            </a:fillRef>
-            <a:effectRef idx="2">
-              <a:schemeClr val="accent1"/>
-            </a:effectRef>
-            <a:fontRef idx="minor">
-              <a:schemeClr val="tx1"/>
-            </a:fontRef>
-          </p:style>
-        </p:cxnSp>
-        <p:sp>
-          <p:nvSpPr>
-            <p:cNvPr id="509" name="文字方塊 508">
-              <a:extLst>
-                <a:ext uri="{FF2B5EF4-FFF2-40B4-BE49-F238E27FC236}">
-                  <a16:creationId xmlns:a16="http://schemas.microsoft.com/office/drawing/2014/main" id="{AEEFA4C6-BA28-45B4-8E98-4A9516AE01B6}"/>
-                </a:ext>
-              </a:extLst>
-            </p:cNvPr>
-            <p:cNvSpPr txBox="1"/>
-            <p:nvPr/>
-          </p:nvSpPr>
-          <p:spPr>
-            <a:xfrm rot="5400000">
-              <a:off x="621528" y="6942982"/>
-              <a:ext cx="1142835" cy="436207"/>
-            </a:xfrm>
-            <a:prstGeom prst="rect">
-              <a:avLst/>
-            </a:prstGeom>
-            <a:noFill/>
-          </p:spPr>
-          <p:txBody>
-            <a:bodyPr wrap="square" rtlCol="0">
-              <a:spAutoFit/>
-            </a:bodyPr>
-            <a:lstStyle/>
-            <a:p>
-              <a:r>
-                <a:rPr lang="en-US" altLang="zh-TW" sz="800" dirty="0" err="1">
-                  <a:latin typeface="Times New Roman" panose="02020603050405020304" pitchFamily="18" charset="0"/>
-                  <a:cs typeface="Times New Roman" panose="02020603050405020304" pitchFamily="18" charset="0"/>
-                </a:rPr>
-                <a:t>offspringMutate</a:t>
-              </a:r>
-              <a:endParaRPr lang="en-US" altLang="zh-TW" sz="800" dirty="0">
+          <a:prstGeom prst="straightConnector1">
+            <a:avLst/>
+          </a:prstGeom>
+          <a:ln>
+            <a:tailEnd type="triangle"/>
+          </a:ln>
+        </p:spPr>
+        <p:style>
+          <a:lnRef idx="3">
+            <a:schemeClr val="accent1"/>
+          </a:lnRef>
+          <a:fillRef idx="0">
+            <a:schemeClr val="accent1"/>
+          </a:fillRef>
+          <a:effectRef idx="2">
+            <a:schemeClr val="accent1"/>
+          </a:effectRef>
+          <a:fontRef idx="minor">
+            <a:schemeClr val="tx1"/>
+          </a:fontRef>
+        </p:style>
+      </p:cxnSp>
+      <p:sp>
+        <p:nvSpPr>
+          <p:cNvPr id="509" name="文字方塊 508">
+            <a:extLst>
+              <a:ext uri="{FF2B5EF4-FFF2-40B4-BE49-F238E27FC236}">
+                <a16:creationId xmlns:a16="http://schemas.microsoft.com/office/drawing/2014/main" id="{AEEFA4C6-BA28-45B4-8E98-4A9516AE01B6}"/>
+              </a:ext>
+            </a:extLst>
+          </p:cNvPr>
+          <p:cNvSpPr txBox="1"/>
+          <p:nvPr/>
+        </p:nvSpPr>
+        <p:spPr>
+          <a:xfrm>
+            <a:off x="9942314" y="5757221"/>
+            <a:ext cx="1142835" cy="338554"/>
+          </a:xfrm>
+          <a:prstGeom prst="rect">
+            <a:avLst/>
+          </a:prstGeom>
+          <a:noFill/>
+        </p:spPr>
+        <p:txBody>
+          <a:bodyPr wrap="square" rtlCol="0">
+            <a:spAutoFit/>
+          </a:bodyPr>
+          <a:lstStyle/>
+          <a:p>
+            <a:r>
+              <a:rPr lang="en-US" altLang="zh-TW" sz="800" dirty="0" err="1">
                 <a:latin typeface="Times New Roman" panose="02020603050405020304" pitchFamily="18" charset="0"/>
                 <a:cs typeface="Times New Roman" panose="02020603050405020304" pitchFamily="18" charset="0"/>
-              </a:endParaRPr>
-            </a:p>
-            <a:p>
-              <a:r>
-                <a:rPr lang="en-US" altLang="zh-TW" sz="800" dirty="0" err="1">
-                  <a:latin typeface="Times New Roman" panose="02020603050405020304" pitchFamily="18" charset="0"/>
-                  <a:cs typeface="Times New Roman" panose="02020603050405020304" pitchFamily="18" charset="0"/>
-                </a:rPr>
-                <a:t>Rate_MU</a:t>
-              </a:r>
-              <a:endParaRPr lang="zh-TW" altLang="en-US" sz="800" dirty="0">
+              </a:rPr>
+              <a:t>offspringMutate</a:t>
+            </a:r>
+            <a:endParaRPr lang="en-US" altLang="zh-TW" sz="800" dirty="0">
+              <a:latin typeface="Times New Roman" panose="02020603050405020304" pitchFamily="18" charset="0"/>
+              <a:cs typeface="Times New Roman" panose="02020603050405020304" pitchFamily="18" charset="0"/>
+            </a:endParaRPr>
+          </a:p>
+          <a:p>
+            <a:r>
+              <a:rPr lang="en-US" altLang="zh-TW" sz="800" dirty="0" err="1">
                 <a:latin typeface="Times New Roman" panose="02020603050405020304" pitchFamily="18" charset="0"/>
                 <a:cs typeface="Times New Roman" panose="02020603050405020304" pitchFamily="18" charset="0"/>
-              </a:endParaRPr>
-            </a:p>
-          </p:txBody>
-        </p:sp>
-        <p:cxnSp>
-          <p:nvCxnSpPr>
-            <p:cNvPr id="510" name="直線接點 509">
-              <a:extLst>
-                <a:ext uri="{FF2B5EF4-FFF2-40B4-BE49-F238E27FC236}">
-                  <a16:creationId xmlns:a16="http://schemas.microsoft.com/office/drawing/2014/main" id="{7D636209-32C9-45A3-9867-3F53513C037F}"/>
-                </a:ext>
-              </a:extLst>
-            </p:cNvPr>
-            <p:cNvCxnSpPr>
-              <a:cxnSpLocks/>
-            </p:cNvCxnSpPr>
-            <p:nvPr/>
-          </p:nvCxnSpPr>
-          <p:spPr>
-            <a:xfrm>
-              <a:off x="739660" y="6604353"/>
-              <a:ext cx="173322" cy="148216"/>
-            </a:xfrm>
-            <a:prstGeom prst="line">
-              <a:avLst/>
-            </a:prstGeom>
-          </p:spPr>
-          <p:style>
-            <a:lnRef idx="3">
-              <a:schemeClr val="dk1"/>
-            </a:lnRef>
-            <a:fillRef idx="0">
-              <a:schemeClr val="dk1"/>
-            </a:fillRef>
-            <a:effectRef idx="2">
-              <a:schemeClr val="dk1"/>
-            </a:effectRef>
-            <a:fontRef idx="minor">
-              <a:schemeClr val="tx1"/>
-            </a:fontRef>
-          </p:style>
-        </p:cxnSp>
-        <p:sp>
-          <p:nvSpPr>
-            <p:cNvPr id="511" name="文字方塊 510">
-              <a:extLst>
-                <a:ext uri="{FF2B5EF4-FFF2-40B4-BE49-F238E27FC236}">
-                  <a16:creationId xmlns:a16="http://schemas.microsoft.com/office/drawing/2014/main" id="{4C3D69AB-3DF5-4ECD-AC3D-B5BEFD6F09F0}"/>
-                </a:ext>
-              </a:extLst>
-            </p:cNvPr>
-            <p:cNvSpPr txBox="1"/>
-            <p:nvPr/>
-          </p:nvSpPr>
-          <p:spPr>
-            <a:xfrm rot="5400000">
-              <a:off x="694062" y="6513306"/>
-              <a:ext cx="437843" cy="356897"/>
-            </a:xfrm>
-            <a:prstGeom prst="rect">
-              <a:avLst/>
-            </a:prstGeom>
-            <a:noFill/>
-          </p:spPr>
-          <p:txBody>
-            <a:bodyPr wrap="square" rtlCol="0">
-              <a:spAutoFit/>
-            </a:bodyPr>
-            <a:lstStyle/>
-            <a:p>
-              <a:r>
-                <a:rPr lang="en-US" altLang="zh-TW" sz="1200" dirty="0">
-                  <a:latin typeface="Times New Roman" panose="02020603050405020304" pitchFamily="18" charset="0"/>
-                  <a:cs typeface="Times New Roman" panose="02020603050405020304" pitchFamily="18" charset="0"/>
-                </a:rPr>
-                <a:t>8</a:t>
-              </a:r>
-              <a:endParaRPr lang="zh-TW" altLang="en-US" sz="1200" dirty="0">
+              </a:rPr>
+              <a:t>Rate_MU</a:t>
+            </a:r>
+            <a:endParaRPr lang="zh-TW" altLang="en-US" sz="800" dirty="0">
+              <a:latin typeface="Times New Roman" panose="02020603050405020304" pitchFamily="18" charset="0"/>
+              <a:cs typeface="Times New Roman" panose="02020603050405020304" pitchFamily="18" charset="0"/>
+            </a:endParaRPr>
+          </a:p>
+        </p:txBody>
+      </p:sp>
+      <p:cxnSp>
+        <p:nvCxnSpPr>
+          <p:cNvPr id="510" name="直線接點 509">
+            <a:extLst>
+              <a:ext uri="{FF2B5EF4-FFF2-40B4-BE49-F238E27FC236}">
+                <a16:creationId xmlns:a16="http://schemas.microsoft.com/office/drawing/2014/main" id="{7D636209-32C9-45A3-9867-3F53513C037F}"/>
+              </a:ext>
+            </a:extLst>
+          </p:cNvPr>
+          <p:cNvCxnSpPr>
+            <a:cxnSpLocks/>
+          </p:cNvCxnSpPr>
+          <p:nvPr/>
+        </p:nvCxnSpPr>
+        <p:spPr>
+          <a:xfrm flipV="1">
+            <a:off x="9957000" y="6143787"/>
+            <a:ext cx="148216" cy="134520"/>
+          </a:xfrm>
+          <a:prstGeom prst="line">
+            <a:avLst/>
+          </a:prstGeom>
+        </p:spPr>
+        <p:style>
+          <a:lnRef idx="3">
+            <a:schemeClr val="dk1"/>
+          </a:lnRef>
+          <a:fillRef idx="0">
+            <a:schemeClr val="dk1"/>
+          </a:fillRef>
+          <a:effectRef idx="2">
+            <a:schemeClr val="dk1"/>
+          </a:effectRef>
+          <a:fontRef idx="minor">
+            <a:schemeClr val="tx1"/>
+          </a:fontRef>
+        </p:style>
+      </p:cxnSp>
+      <p:sp>
+        <p:nvSpPr>
+          <p:cNvPr id="511" name="文字方塊 510">
+            <a:extLst>
+              <a:ext uri="{FF2B5EF4-FFF2-40B4-BE49-F238E27FC236}">
+                <a16:creationId xmlns:a16="http://schemas.microsoft.com/office/drawing/2014/main" id="{4C3D69AB-3DF5-4ECD-AC3D-B5BEFD6F09F0}"/>
+              </a:ext>
+            </a:extLst>
+          </p:cNvPr>
+          <p:cNvSpPr txBox="1"/>
+          <p:nvPr/>
+        </p:nvSpPr>
+        <p:spPr>
+          <a:xfrm>
+            <a:off x="9825479" y="6005285"/>
+            <a:ext cx="437843" cy="276999"/>
+          </a:xfrm>
+          <a:prstGeom prst="rect">
+            <a:avLst/>
+          </a:prstGeom>
+          <a:noFill/>
+        </p:spPr>
+        <p:txBody>
+          <a:bodyPr wrap="square" rtlCol="0">
+            <a:spAutoFit/>
+          </a:bodyPr>
+          <a:lstStyle/>
+          <a:p>
+            <a:r>
+              <a:rPr lang="en-US" altLang="zh-TW" sz="1200" dirty="0">
                 <a:latin typeface="Times New Roman" panose="02020603050405020304" pitchFamily="18" charset="0"/>
                 <a:cs typeface="Times New Roman" panose="02020603050405020304" pitchFamily="18" charset="0"/>
-              </a:endParaRPr>
-            </a:p>
-          </p:txBody>
-        </p:sp>
-      </p:grpSp>
+              </a:rPr>
+              <a:t>8</a:t>
+            </a:r>
+            <a:endParaRPr lang="zh-TW" altLang="en-US" sz="1200" dirty="0">
+              <a:latin typeface="Times New Roman" panose="02020603050405020304" pitchFamily="18" charset="0"/>
+              <a:cs typeface="Times New Roman" panose="02020603050405020304" pitchFamily="18" charset="0"/>
+            </a:endParaRPr>
+          </a:p>
+        </p:txBody>
+      </p:sp>
       <p:cxnSp>
         <p:nvCxnSpPr>
           <p:cNvPr id="512" name="直線接點 511">
@@ -14379,7 +14174,7 @@
         </p:nvCxnSpPr>
         <p:spPr>
           <a:xfrm flipH="1">
-            <a:off x="9211856" y="6637673"/>
+            <a:off x="9218749" y="6430611"/>
             <a:ext cx="811184" cy="0"/>
           </a:xfrm>
           <a:prstGeom prst="line">
@@ -15013,10 +14808,10 @@
         </p:nvGrpSpPr>
         <p:grpSpPr>
           <a:xfrm>
-            <a:off x="9046254" y="4519371"/>
-            <a:ext cx="828314" cy="614006"/>
-            <a:chOff x="3690433" y="3624513"/>
-            <a:chExt cx="1388005" cy="614006"/>
+            <a:off x="9046254" y="4740737"/>
+            <a:ext cx="828314" cy="392640"/>
+            <a:chOff x="3690433" y="3845879"/>
+            <a:chExt cx="1388005" cy="392640"/>
           </a:xfrm>
         </p:grpSpPr>
         <p:grpSp>
@@ -15033,10 +14828,10 @@
           </p:nvGrpSpPr>
           <p:grpSpPr>
             <a:xfrm>
-              <a:off x="3979482" y="3624513"/>
-              <a:ext cx="889123" cy="417945"/>
-              <a:chOff x="3600931" y="1910289"/>
-              <a:chExt cx="1254587" cy="677653"/>
+              <a:off x="3979482" y="3845879"/>
+              <a:ext cx="719093" cy="196577"/>
+              <a:chOff x="3600931" y="2269213"/>
+              <a:chExt cx="1014668" cy="318729"/>
             </a:xfrm>
           </p:grpSpPr>
           <p:sp>
@@ -15123,48 +14918,6 @@
               </a:fontRef>
             </p:style>
           </p:cxnSp>
-          <p:sp>
-            <p:nvSpPr>
-              <p:cNvPr id="550" name="文字方塊 549">
-                <a:extLst>
-                  <a:ext uri="{FF2B5EF4-FFF2-40B4-BE49-F238E27FC236}">
-                    <a16:creationId xmlns:a16="http://schemas.microsoft.com/office/drawing/2014/main" id="{F0B47479-F30F-4FD2-9B34-FC4CD70A6734}"/>
-                  </a:ext>
-                </a:extLst>
-              </p:cNvPr>
-              <p:cNvSpPr txBox="1"/>
-              <p:nvPr/>
-            </p:nvSpPr>
-            <p:spPr>
-              <a:xfrm>
-                <a:off x="3698239" y="1910289"/>
-                <a:ext cx="1157279" cy="449124"/>
-              </a:xfrm>
-              <a:prstGeom prst="rect">
-                <a:avLst/>
-              </a:prstGeom>
-              <a:noFill/>
-            </p:spPr>
-            <p:txBody>
-              <a:bodyPr wrap="square" rtlCol="0">
-                <a:spAutoFit/>
-              </a:bodyPr>
-              <a:lstStyle/>
-              <a:p>
-                <a:r>
-                  <a:rPr lang="en-US" altLang="zh-TW" sz="1200" dirty="0">
-                    <a:latin typeface="Times New Roman" panose="02020603050405020304" pitchFamily="18" charset="0"/>
-                    <a:cs typeface="Times New Roman" panose="02020603050405020304" pitchFamily="18" charset="0"/>
-                  </a:rPr>
-                  <a:t>11*2</a:t>
-                </a:r>
-                <a:endParaRPr lang="zh-TW" altLang="en-US" sz="1200" dirty="0">
-                  <a:latin typeface="Times New Roman" panose="02020603050405020304" pitchFamily="18" charset="0"/>
-                  <a:cs typeface="Times New Roman" panose="02020603050405020304" pitchFamily="18" charset="0"/>
-                </a:endParaRPr>
-              </a:p>
-            </p:txBody>
-          </p:sp>
         </p:grpSp>
         <p:sp>
           <p:nvSpPr>
@@ -15199,7 +14952,7 @@
                   <a:latin typeface="Times New Roman" panose="02020603050405020304" pitchFamily="18" charset="0"/>
                   <a:cs typeface="Times New Roman" panose="02020603050405020304" pitchFamily="18" charset="0"/>
                 </a:rPr>
-                <a:t>newStateMU</a:t>
+                <a:t>TourInd_MU</a:t>
               </a:r>
               <a:endParaRPr lang="zh-TW" altLang="en-US" sz="800" dirty="0">
                 <a:latin typeface="Times New Roman" panose="02020603050405020304" pitchFamily="18" charset="0"/>
@@ -15209,94 +14962,6 @@
           </p:txBody>
         </p:sp>
       </p:grpSp>
-      <p:sp>
-        <p:nvSpPr>
-          <p:cNvPr id="551" name="箭號: 向右 550">
-            <a:extLst>
-              <a:ext uri="{FF2B5EF4-FFF2-40B4-BE49-F238E27FC236}">
-                <a16:creationId xmlns:a16="http://schemas.microsoft.com/office/drawing/2014/main" id="{56FD5496-EFEC-4186-8D46-C3AF66D8BB18}"/>
-              </a:ext>
-            </a:extLst>
-          </p:cNvPr>
-          <p:cNvSpPr/>
-          <p:nvPr/>
-        </p:nvSpPr>
-        <p:spPr>
-          <a:xfrm rot="16200000">
-            <a:off x="8984089" y="4475672"/>
-            <a:ext cx="647694" cy="178370"/>
-          </a:xfrm>
-          <a:prstGeom prst="rightArrow">
-            <a:avLst/>
-          </a:prstGeom>
-        </p:spPr>
-        <p:style>
-          <a:lnRef idx="2">
-            <a:schemeClr val="accent1">
-              <a:shade val="50000"/>
-            </a:schemeClr>
-          </a:lnRef>
-          <a:fillRef idx="1">
-            <a:schemeClr val="accent1"/>
-          </a:fillRef>
-          <a:effectRef idx="0">
-            <a:schemeClr val="accent1"/>
-          </a:effectRef>
-          <a:fontRef idx="minor">
-            <a:schemeClr val="lt1"/>
-          </a:fontRef>
-        </p:style>
-        <p:txBody>
-          <a:bodyPr rtlCol="0" anchor="ctr"/>
-          <a:lstStyle/>
-          <a:p>
-            <a:pPr algn="ctr"/>
-            <a:endParaRPr lang="zh-TW" altLang="en-US"/>
-          </a:p>
-        </p:txBody>
-      </p:sp>
-      <p:sp>
-        <p:nvSpPr>
-          <p:cNvPr id="552" name="文字方塊 551">
-            <a:extLst>
-              <a:ext uri="{FF2B5EF4-FFF2-40B4-BE49-F238E27FC236}">
-                <a16:creationId xmlns:a16="http://schemas.microsoft.com/office/drawing/2014/main" id="{890F950F-B614-4C85-8847-F41D0B6A380A}"/>
-              </a:ext>
-            </a:extLst>
-          </p:cNvPr>
-          <p:cNvSpPr txBox="1"/>
-          <p:nvPr/>
-        </p:nvSpPr>
-        <p:spPr>
-          <a:xfrm>
-            <a:off x="8964322" y="4061543"/>
-            <a:ext cx="768895" cy="215444"/>
-          </a:xfrm>
-          <a:prstGeom prst="rect">
-            <a:avLst/>
-          </a:prstGeom>
-          <a:noFill/>
-        </p:spPr>
-        <p:txBody>
-          <a:bodyPr wrap="square" rtlCol="0">
-            <a:spAutoFit/>
-          </a:bodyPr>
-          <a:lstStyle/>
-          <a:p>
-            <a:r>
-              <a:rPr lang="en-US" altLang="zh-TW" sz="800" dirty="0" err="1">
-                <a:latin typeface="Times New Roman" panose="02020603050405020304" pitchFamily="18" charset="0"/>
-                <a:cs typeface="Times New Roman" panose="02020603050405020304" pitchFamily="18" charset="0"/>
-              </a:rPr>
-              <a:t>TourStateMU</a:t>
-            </a:r>
-            <a:endParaRPr lang="zh-TW" altLang="en-US" sz="800" dirty="0">
-              <a:latin typeface="Times New Roman" panose="02020603050405020304" pitchFamily="18" charset="0"/>
-              <a:cs typeface="Times New Roman" panose="02020603050405020304" pitchFamily="18" charset="0"/>
-            </a:endParaRPr>
-          </a:p>
-        </p:txBody>
-      </p:sp>
       <p:sp>
         <p:nvSpPr>
           <p:cNvPr id="553" name="箭號: 向右 552">
@@ -15357,7 +15022,7 @@
         </p:nvSpPr>
         <p:spPr>
           <a:xfrm>
-            <a:off x="86616" y="5794759"/>
+            <a:off x="-9094" y="5794456"/>
             <a:ext cx="1162511" cy="215444"/>
           </a:xfrm>
           <a:prstGeom prst="rect">
@@ -15376,7 +15041,7 @@
                 <a:latin typeface="Times New Roman" panose="02020603050405020304" pitchFamily="18" charset="0"/>
                 <a:cs typeface="Times New Roman" panose="02020603050405020304" pitchFamily="18" charset="0"/>
               </a:rPr>
-              <a:t>State_FR</a:t>
+              <a:t>Ind_wb_FR</a:t>
             </a:r>
             <a:endParaRPr lang="zh-TW" altLang="en-US" sz="800" dirty="0">
               <a:latin typeface="Times New Roman" panose="02020603050405020304" pitchFamily="18" charset="0"/>
@@ -15399,10 +15064,10 @@
         </p:nvGrpSpPr>
         <p:grpSpPr>
           <a:xfrm>
-            <a:off x="10136319" y="4484874"/>
-            <a:ext cx="959869" cy="680779"/>
-            <a:chOff x="3680512" y="3609048"/>
-            <a:chExt cx="1644796" cy="680779"/>
+            <a:off x="10103553" y="4481440"/>
+            <a:ext cx="929180" cy="684213"/>
+            <a:chOff x="3624364" y="3605614"/>
+            <a:chExt cx="1592208" cy="684213"/>
           </a:xfrm>
         </p:grpSpPr>
         <p:grpSp>
@@ -15419,10 +15084,10 @@
           </p:nvGrpSpPr>
           <p:grpSpPr>
             <a:xfrm>
-              <a:off x="3871662" y="3609048"/>
-              <a:ext cx="1453646" cy="433410"/>
-              <a:chOff x="3448792" y="1885214"/>
-              <a:chExt cx="2051150" cy="702728"/>
+              <a:off x="3624364" y="3605614"/>
+              <a:ext cx="1555000" cy="436845"/>
+              <a:chOff x="3099845" y="1879645"/>
+              <a:chExt cx="2194164" cy="708297"/>
             </a:xfrm>
           </p:grpSpPr>
           <p:sp>
@@ -15523,8 +15188,8 @@
             </p:nvSpPr>
             <p:spPr>
               <a:xfrm>
-                <a:off x="3448792" y="1885214"/>
-                <a:ext cx="2051150" cy="449124"/>
+                <a:off x="3099845" y="1879645"/>
+                <a:ext cx="2194164" cy="449124"/>
               </a:xfrm>
               <a:prstGeom prst="rect">
                 <a:avLst/>
@@ -15542,7 +15207,7 @@
                     <a:latin typeface="Times New Roman" panose="02020603050405020304" pitchFamily="18" charset="0"/>
                     <a:cs typeface="Times New Roman" panose="02020603050405020304" pitchFamily="18" charset="0"/>
                   </a:rPr>
-                  <a:t>11*2</a:t>
+                  <a:t>11*2+8+10</a:t>
                 </a:r>
                 <a:endParaRPr lang="zh-TW" altLang="en-US" sz="1200" dirty="0">
                   <a:latin typeface="Times New Roman" panose="02020603050405020304" pitchFamily="18" charset="0"/>
@@ -15585,7 +15250,7 @@
                   <a:latin typeface="Times New Roman" panose="02020603050405020304" pitchFamily="18" charset="0"/>
                   <a:cs typeface="Times New Roman" panose="02020603050405020304" pitchFamily="18" charset="0"/>
                 </a:rPr>
-                <a:t>mutateState_MU</a:t>
+                <a:t>mutateInd_MU</a:t>
               </a:r>
               <a:endParaRPr lang="zh-TW" altLang="en-US" sz="800" dirty="0">
                 <a:latin typeface="Times New Roman" panose="02020603050405020304" pitchFamily="18" charset="0"/>
@@ -15609,10 +15274,10 @@
         </p:nvGrpSpPr>
         <p:grpSpPr>
           <a:xfrm>
-            <a:off x="11047023" y="4469693"/>
-            <a:ext cx="2335032" cy="630797"/>
-            <a:chOff x="3929078" y="3608849"/>
-            <a:chExt cx="1635263" cy="630797"/>
+            <a:off x="11047023" y="4478784"/>
+            <a:ext cx="2176578" cy="621706"/>
+            <a:chOff x="3929078" y="3617940"/>
+            <a:chExt cx="1524295" cy="621706"/>
           </a:xfrm>
         </p:grpSpPr>
         <p:grpSp>
@@ -15629,10 +15294,10 @@
           </p:nvGrpSpPr>
           <p:grpSpPr>
             <a:xfrm>
-              <a:off x="3979483" y="3608849"/>
-              <a:ext cx="1584858" cy="433610"/>
-              <a:chOff x="3600931" y="1884890"/>
-              <a:chExt cx="2236295" cy="703052"/>
+              <a:off x="3954396" y="3617940"/>
+              <a:ext cx="1453646" cy="424519"/>
+              <a:chOff x="3565532" y="1899630"/>
+              <a:chExt cx="2051150" cy="688312"/>
             </a:xfrm>
           </p:grpSpPr>
           <p:sp>
@@ -15733,7 +15398,7 @@
             </p:nvSpPr>
             <p:spPr>
               <a:xfrm>
-                <a:off x="3786076" y="1884890"/>
+                <a:off x="3565532" y="1899630"/>
                 <a:ext cx="2051150" cy="449124"/>
               </a:xfrm>
               <a:prstGeom prst="rect">
@@ -15752,7 +15417,7 @@
                     <a:latin typeface="Times New Roman" panose="02020603050405020304" pitchFamily="18" charset="0"/>
                     <a:cs typeface="Times New Roman" panose="02020603050405020304" pitchFamily="18" charset="0"/>
                   </a:rPr>
-                  <a:t>11*2</a:t>
+                  <a:t>11*2+8+10</a:t>
                 </a:r>
                 <a:endParaRPr lang="zh-TW" altLang="en-US" sz="1200" dirty="0">
                   <a:latin typeface="Times New Roman" panose="02020603050405020304" pitchFamily="18" charset="0"/>
@@ -15795,7 +15460,7 @@
                   <a:latin typeface="Times New Roman" panose="02020603050405020304" pitchFamily="18" charset="0"/>
                   <a:cs typeface="Times New Roman" panose="02020603050405020304" pitchFamily="18" charset="0"/>
                 </a:rPr>
-                <a:t>mutateState_EF</a:t>
+                <a:t>mutateInd_EF</a:t>
               </a:r>
               <a:endParaRPr lang="zh-TW" altLang="en-US" sz="800" dirty="0">
                 <a:latin typeface="Times New Roman" panose="02020603050405020304" pitchFamily="18" charset="0"/>
@@ -16100,52 +15765,6 @@
       </p:sp>
       <p:sp>
         <p:nvSpPr>
-          <p:cNvPr id="574" name="流程圖: 接點 573">
-            <a:extLst>
-              <a:ext uri="{FF2B5EF4-FFF2-40B4-BE49-F238E27FC236}">
-                <a16:creationId xmlns:a16="http://schemas.microsoft.com/office/drawing/2014/main" id="{C57C177E-EC60-4F51-A981-BBE058AAB102}"/>
-              </a:ext>
-            </a:extLst>
-          </p:cNvPr>
-          <p:cNvSpPr/>
-          <p:nvPr/>
-        </p:nvSpPr>
-        <p:spPr>
-          <a:xfrm>
-            <a:off x="9237523" y="4755093"/>
-            <a:ext cx="135462" cy="154674"/>
-          </a:xfrm>
-          <a:prstGeom prst="flowChartConnector">
-            <a:avLst/>
-          </a:prstGeom>
-        </p:spPr>
-        <p:style>
-          <a:lnRef idx="2">
-            <a:schemeClr val="dk1">
-              <a:shade val="50000"/>
-            </a:schemeClr>
-          </a:lnRef>
-          <a:fillRef idx="1">
-            <a:schemeClr val="dk1"/>
-          </a:fillRef>
-          <a:effectRef idx="0">
-            <a:schemeClr val="dk1"/>
-          </a:effectRef>
-          <a:fontRef idx="minor">
-            <a:schemeClr val="lt1"/>
-          </a:fontRef>
-        </p:style>
-        <p:txBody>
-          <a:bodyPr rtlCol="0" anchor="ctr"/>
-          <a:lstStyle/>
-          <a:p>
-            <a:pPr algn="ctr"/>
-            <a:endParaRPr lang="zh-TW" altLang="en-US"/>
-          </a:p>
-        </p:txBody>
-      </p:sp>
-      <p:sp>
-        <p:nvSpPr>
           <p:cNvPr id="575" name="文字方塊 574">
             <a:extLst>
               <a:ext uri="{FF2B5EF4-FFF2-40B4-BE49-F238E27FC236}">
@@ -16393,6 +16012,350 @@
           </a:fontRef>
         </p:style>
       </p:cxnSp>
+      <p:cxnSp>
+        <p:nvCxnSpPr>
+          <p:cNvPr id="360" name="直線接點 359">
+            <a:extLst>
+              <a:ext uri="{FF2B5EF4-FFF2-40B4-BE49-F238E27FC236}">
+                <a16:creationId xmlns:a16="http://schemas.microsoft.com/office/drawing/2014/main" id="{E9C5DFE8-118B-4A6C-B2A8-0D982D0D5A43}"/>
+              </a:ext>
+            </a:extLst>
+          </p:cNvPr>
+          <p:cNvCxnSpPr>
+            <a:cxnSpLocks/>
+          </p:cNvCxnSpPr>
+          <p:nvPr/>
+        </p:nvCxnSpPr>
+        <p:spPr>
+          <a:xfrm>
+            <a:off x="2820029" y="4467618"/>
+            <a:ext cx="8119" cy="509721"/>
+          </a:xfrm>
+          <a:prstGeom prst="line">
+            <a:avLst/>
+          </a:prstGeom>
+        </p:spPr>
+        <p:style>
+          <a:lnRef idx="3">
+            <a:schemeClr val="accent1"/>
+          </a:lnRef>
+          <a:fillRef idx="0">
+            <a:schemeClr val="accent1"/>
+          </a:fillRef>
+          <a:effectRef idx="2">
+            <a:schemeClr val="accent1"/>
+          </a:effectRef>
+          <a:fontRef idx="minor">
+            <a:schemeClr val="tx1"/>
+          </a:fontRef>
+        </p:style>
+      </p:cxnSp>
+      <p:cxnSp>
+        <p:nvCxnSpPr>
+          <p:cNvPr id="371" name="直線接點 370">
+            <a:extLst>
+              <a:ext uri="{FF2B5EF4-FFF2-40B4-BE49-F238E27FC236}">
+                <a16:creationId xmlns:a16="http://schemas.microsoft.com/office/drawing/2014/main" id="{D0C31A28-7320-489E-A7BD-A421E20EDBE9}"/>
+              </a:ext>
+            </a:extLst>
+          </p:cNvPr>
+          <p:cNvCxnSpPr>
+            <a:cxnSpLocks/>
+            <a:stCxn id="290" idx="5"/>
+          </p:cNvCxnSpPr>
+          <p:nvPr/>
+        </p:nvCxnSpPr>
+        <p:spPr>
+          <a:xfrm>
+            <a:off x="7374684" y="2305042"/>
+            <a:ext cx="200866" cy="0"/>
+          </a:xfrm>
+          <a:prstGeom prst="line">
+            <a:avLst/>
+          </a:prstGeom>
+        </p:spPr>
+        <p:style>
+          <a:lnRef idx="3">
+            <a:schemeClr val="accent4"/>
+          </a:lnRef>
+          <a:fillRef idx="0">
+            <a:schemeClr val="accent4"/>
+          </a:fillRef>
+          <a:effectRef idx="2">
+            <a:schemeClr val="accent4"/>
+          </a:effectRef>
+          <a:fontRef idx="minor">
+            <a:schemeClr val="tx1"/>
+          </a:fontRef>
+        </p:style>
+      </p:cxnSp>
+      <p:cxnSp>
+        <p:nvCxnSpPr>
+          <p:cNvPr id="385" name="直線單箭頭接點 384">
+            <a:extLst>
+              <a:ext uri="{FF2B5EF4-FFF2-40B4-BE49-F238E27FC236}">
+                <a16:creationId xmlns:a16="http://schemas.microsoft.com/office/drawing/2014/main" id="{14D3E6BD-0A98-4A56-BA8B-8F3E229482FE}"/>
+              </a:ext>
+            </a:extLst>
+          </p:cNvPr>
+          <p:cNvCxnSpPr>
+            <a:cxnSpLocks/>
+          </p:cNvCxnSpPr>
+          <p:nvPr/>
+        </p:nvCxnSpPr>
+        <p:spPr>
+          <a:xfrm flipH="1">
+            <a:off x="7232740" y="2299439"/>
+            <a:ext cx="228776" cy="211476"/>
+          </a:xfrm>
+          <a:prstGeom prst="straightConnector1">
+            <a:avLst/>
+          </a:prstGeom>
+          <a:ln>
+            <a:tailEnd type="triangle"/>
+          </a:ln>
+        </p:spPr>
+        <p:style>
+          <a:lnRef idx="3">
+            <a:schemeClr val="accent4"/>
+          </a:lnRef>
+          <a:fillRef idx="0">
+            <a:schemeClr val="accent4"/>
+          </a:fillRef>
+          <a:effectRef idx="2">
+            <a:schemeClr val="accent4"/>
+          </a:effectRef>
+          <a:fontRef idx="minor">
+            <a:schemeClr val="tx1"/>
+          </a:fontRef>
+        </p:style>
+      </p:cxnSp>
+      <p:grpSp>
+        <p:nvGrpSpPr>
+          <p:cNvPr id="386" name="群組 385">
+            <a:extLst>
+              <a:ext uri="{FF2B5EF4-FFF2-40B4-BE49-F238E27FC236}">
+                <a16:creationId xmlns:a16="http://schemas.microsoft.com/office/drawing/2014/main" id="{4924A611-095B-43A3-88A5-B3F12D7BD239}"/>
+              </a:ext>
+            </a:extLst>
+          </p:cNvPr>
+          <p:cNvGrpSpPr/>
+          <p:nvPr/>
+        </p:nvGrpSpPr>
+        <p:grpSpPr>
+          <a:xfrm>
+            <a:off x="5728790" y="6542004"/>
+            <a:ext cx="3585601" cy="344765"/>
+            <a:chOff x="242635" y="6407804"/>
+            <a:chExt cx="1472477" cy="344765"/>
+          </a:xfrm>
+        </p:grpSpPr>
+        <p:cxnSp>
+          <p:nvCxnSpPr>
+            <p:cNvPr id="387" name="直線單箭頭接點 386">
+              <a:extLst>
+                <a:ext uri="{FF2B5EF4-FFF2-40B4-BE49-F238E27FC236}">
+                  <a16:creationId xmlns:a16="http://schemas.microsoft.com/office/drawing/2014/main" id="{582EBACC-7F6B-4B51-9B6D-490223F847D7}"/>
+                </a:ext>
+              </a:extLst>
+            </p:cNvPr>
+            <p:cNvCxnSpPr>
+              <a:cxnSpLocks/>
+            </p:cNvCxnSpPr>
+            <p:nvPr/>
+          </p:nvCxnSpPr>
+          <p:spPr>
+            <a:xfrm>
+              <a:off x="271714" y="6664305"/>
+              <a:ext cx="1226857" cy="0"/>
+            </a:xfrm>
+            <a:prstGeom prst="straightConnector1">
+              <a:avLst/>
+            </a:prstGeom>
+            <a:ln>
+              <a:tailEnd type="triangle"/>
+            </a:ln>
+          </p:spPr>
+          <p:style>
+            <a:lnRef idx="3">
+              <a:schemeClr val="accent1"/>
+            </a:lnRef>
+            <a:fillRef idx="0">
+              <a:schemeClr val="accent1"/>
+            </a:fillRef>
+            <a:effectRef idx="2">
+              <a:schemeClr val="accent1"/>
+            </a:effectRef>
+            <a:fontRef idx="minor">
+              <a:schemeClr val="tx1"/>
+            </a:fontRef>
+          </p:style>
+        </p:cxnSp>
+        <p:sp>
+          <p:nvSpPr>
+            <p:cNvPr id="388" name="文字方塊 387">
+              <a:extLst>
+                <a:ext uri="{FF2B5EF4-FFF2-40B4-BE49-F238E27FC236}">
+                  <a16:creationId xmlns:a16="http://schemas.microsoft.com/office/drawing/2014/main" id="{CF8932C2-24BF-4731-89AA-8ED3C57B0EA9}"/>
+                </a:ext>
+              </a:extLst>
+            </p:cNvPr>
+            <p:cNvSpPr txBox="1"/>
+            <p:nvPr/>
+          </p:nvSpPr>
+          <p:spPr>
+            <a:xfrm>
+              <a:off x="242635" y="6469359"/>
+              <a:ext cx="1472477" cy="215444"/>
+            </a:xfrm>
+            <a:prstGeom prst="rect">
+              <a:avLst/>
+            </a:prstGeom>
+            <a:noFill/>
+          </p:spPr>
+          <p:txBody>
+            <a:bodyPr wrap="square" rtlCol="0">
+              <a:spAutoFit/>
+            </a:bodyPr>
+            <a:lstStyle/>
+            <a:p>
+              <a:r>
+                <a:rPr lang="en-US" altLang="zh-TW" sz="800" dirty="0" err="1">
+                  <a:latin typeface="Times New Roman" panose="02020603050405020304" pitchFamily="18" charset="0"/>
+                  <a:cs typeface="Times New Roman" panose="02020603050405020304" pitchFamily="18" charset="0"/>
+                </a:rPr>
+                <a:t>popMutateRate_CRX</a:t>
+              </a:r>
+              <a:endParaRPr lang="zh-TW" altLang="en-US" sz="800" dirty="0">
+                <a:latin typeface="Times New Roman" panose="02020603050405020304" pitchFamily="18" charset="0"/>
+                <a:cs typeface="Times New Roman" panose="02020603050405020304" pitchFamily="18" charset="0"/>
+              </a:endParaRPr>
+            </a:p>
+          </p:txBody>
+        </p:sp>
+        <p:cxnSp>
+          <p:nvCxnSpPr>
+            <p:cNvPr id="389" name="直線接點 388">
+              <a:extLst>
+                <a:ext uri="{FF2B5EF4-FFF2-40B4-BE49-F238E27FC236}">
+                  <a16:creationId xmlns:a16="http://schemas.microsoft.com/office/drawing/2014/main" id="{9F8694C9-52E3-4672-83F4-10A0FB3B2582}"/>
+                </a:ext>
+              </a:extLst>
+            </p:cNvPr>
+            <p:cNvCxnSpPr>
+              <a:cxnSpLocks/>
+            </p:cNvCxnSpPr>
+            <p:nvPr/>
+          </p:nvCxnSpPr>
+          <p:spPr>
+            <a:xfrm>
+              <a:off x="739660" y="6604353"/>
+              <a:ext cx="173322" cy="148216"/>
+            </a:xfrm>
+            <a:prstGeom prst="line">
+              <a:avLst/>
+            </a:prstGeom>
+          </p:spPr>
+          <p:style>
+            <a:lnRef idx="3">
+              <a:schemeClr val="dk1"/>
+            </a:lnRef>
+            <a:fillRef idx="0">
+              <a:schemeClr val="dk1"/>
+            </a:fillRef>
+            <a:effectRef idx="2">
+              <a:schemeClr val="dk1"/>
+            </a:effectRef>
+            <a:fontRef idx="minor">
+              <a:schemeClr val="tx1"/>
+            </a:fontRef>
+          </p:style>
+        </p:cxnSp>
+        <p:sp>
+          <p:nvSpPr>
+            <p:cNvPr id="390" name="文字方塊 389">
+              <a:extLst>
+                <a:ext uri="{FF2B5EF4-FFF2-40B4-BE49-F238E27FC236}">
+                  <a16:creationId xmlns:a16="http://schemas.microsoft.com/office/drawing/2014/main" id="{937B8D56-743C-4B55-A9C5-D6DA872AC919}"/>
+                </a:ext>
+              </a:extLst>
+            </p:cNvPr>
+            <p:cNvSpPr txBox="1"/>
+            <p:nvPr/>
+          </p:nvSpPr>
+          <p:spPr>
+            <a:xfrm>
+              <a:off x="767546" y="6407804"/>
+              <a:ext cx="564135" cy="276999"/>
+            </a:xfrm>
+            <a:prstGeom prst="rect">
+              <a:avLst/>
+            </a:prstGeom>
+            <a:noFill/>
+          </p:spPr>
+          <p:txBody>
+            <a:bodyPr wrap="square" rtlCol="0">
+              <a:spAutoFit/>
+            </a:bodyPr>
+            <a:lstStyle/>
+            <a:p>
+              <a:r>
+                <a:rPr lang="en-US" altLang="zh-TW" sz="1200" dirty="0">
+                  <a:latin typeface="Times New Roman" panose="02020603050405020304" pitchFamily="18" charset="0"/>
+                  <a:cs typeface="Times New Roman" panose="02020603050405020304" pitchFamily="18" charset="0"/>
+                </a:rPr>
+                <a:t>8</a:t>
+              </a:r>
+              <a:endParaRPr lang="zh-TW" altLang="en-US" sz="1200" dirty="0">
+                <a:latin typeface="Times New Roman" panose="02020603050405020304" pitchFamily="18" charset="0"/>
+                <a:cs typeface="Times New Roman" panose="02020603050405020304" pitchFamily="18" charset="0"/>
+              </a:endParaRPr>
+            </a:p>
+          </p:txBody>
+        </p:sp>
+      </p:grpSp>
+      <p:sp>
+        <p:nvSpPr>
+          <p:cNvPr id="433" name="文字方塊 432">
+            <a:extLst>
+              <a:ext uri="{FF2B5EF4-FFF2-40B4-BE49-F238E27FC236}">
+                <a16:creationId xmlns:a16="http://schemas.microsoft.com/office/drawing/2014/main" id="{63FA8711-B9D2-46A8-A5C8-26A44676A5BE}"/>
+              </a:ext>
+            </a:extLst>
+          </p:cNvPr>
+          <p:cNvSpPr txBox="1"/>
+          <p:nvPr/>
+        </p:nvSpPr>
+        <p:spPr>
+          <a:xfrm>
+            <a:off x="8989113" y="4509646"/>
+            <a:ext cx="930119" cy="276999"/>
+          </a:xfrm>
+          <a:prstGeom prst="rect">
+            <a:avLst/>
+          </a:prstGeom>
+          <a:noFill/>
+        </p:spPr>
+        <p:txBody>
+          <a:bodyPr wrap="square" rtlCol="0">
+            <a:spAutoFit/>
+          </a:bodyPr>
+          <a:lstStyle/>
+          <a:p>
+            <a:r>
+              <a:rPr lang="en-US" altLang="zh-TW" sz="1200" dirty="0">
+                <a:latin typeface="Times New Roman" panose="02020603050405020304" pitchFamily="18" charset="0"/>
+                <a:cs typeface="Times New Roman" panose="02020603050405020304" pitchFamily="18" charset="0"/>
+              </a:rPr>
+              <a:t>11*2+8+10</a:t>
+            </a:r>
+            <a:endParaRPr lang="zh-TW" altLang="en-US" sz="1200" dirty="0">
+              <a:latin typeface="Times New Roman" panose="02020603050405020304" pitchFamily="18" charset="0"/>
+              <a:cs typeface="Times New Roman" panose="02020603050405020304" pitchFamily="18" charset="0"/>
+            </a:endParaRPr>
+          </a:p>
+        </p:txBody>
+      </p:sp>
     </p:spTree>
     <p:extLst>
       <p:ext uri="{BB962C8B-B14F-4D97-AF65-F5344CB8AC3E}">

</xml_diff>